<commit_message>
Changes in explanations of the off-heap index/segment Section 3.4
</commit_message>
<xml_diff>
--- a/VLDB2018/off-heap.pptx
+++ b/VLDB2018/off-heap.pptx
@@ -104,6 +104,22 @@
       </a:defRPr>
     </a:lvl9pPr>
   </p:defaultTextStyle>
+  <p:extLst>
+    <p:ext uri="{EFAFB233-063F-42B5-8137-9DF3F51BA10A}">
+      <p15:sldGuideLst xmlns:p15="http://schemas.microsoft.com/office/powerpoint/2012/main">
+        <p15:guide id="1" orient="horz" pos="2160">
+          <p15:clr>
+            <a:srgbClr val="A4A3A4"/>
+          </p15:clr>
+        </p15:guide>
+        <p15:guide id="2" pos="2880">
+          <p15:clr>
+            <a:srgbClr val="A4A3A4"/>
+          </p15:clr>
+        </p15:guide>
+      </p15:sldGuideLst>
+    </p:ext>
+  </p:extLst>
 </p:presentation>
 </file>
 
@@ -145,10 +161,9 @@
           <a:lstStyle/>
           <a:p>
             <a:r>
-              <a:rPr lang="en-US" smtClean="0"/>
+              <a:rPr lang="en-US"/>
               <a:t>Click to edit Master title style</a:t>
             </a:r>
-            <a:endParaRPr lang="en-US"/>
           </a:p>
         </p:txBody>
       </p:sp>
@@ -264,10 +279,9 @@
           </a:lstStyle>
           <a:p>
             <a:r>
-              <a:rPr lang="en-US" smtClean="0"/>
+              <a:rPr lang="en-US"/>
               <a:t>Click to edit Master subtitle style</a:t>
             </a:r>
-            <a:endParaRPr lang="en-US"/>
           </a:p>
         </p:txBody>
       </p:sp>
@@ -288,7 +302,7 @@
           <a:p>
             <a:fld id="{45A0B75F-C9A1-2042-8F04-68C06F63F9D5}" type="datetimeFigureOut">
               <a:rPr lang="en-US" smtClean="0"/>
-              <a:t>12/12/17</a:t>
+              <a:t>2/21/18</a:t>
             </a:fld>
             <a:endParaRPr lang="en-US"/>
           </a:p>
@@ -382,10 +396,9 @@
           <a:lstStyle/>
           <a:p>
             <a:r>
-              <a:rPr lang="en-US" smtClean="0"/>
+              <a:rPr lang="en-US"/>
               <a:t>Click to edit Master title style</a:t>
             </a:r>
-            <a:endParaRPr lang="en-US"/>
           </a:p>
         </p:txBody>
       </p:sp>
@@ -406,38 +419,37 @@
           <a:p>
             <a:pPr lvl="0"/>
             <a:r>
-              <a:rPr lang="en-US" smtClean="0"/>
+              <a:rPr lang="en-US"/>
               <a:t>Click to edit Master text styles</a:t>
             </a:r>
           </a:p>
           <a:p>
             <a:pPr lvl="1"/>
             <a:r>
-              <a:rPr lang="en-US" smtClean="0"/>
+              <a:rPr lang="en-US"/>
               <a:t>Second level</a:t>
             </a:r>
           </a:p>
           <a:p>
             <a:pPr lvl="2"/>
             <a:r>
-              <a:rPr lang="en-US" smtClean="0"/>
+              <a:rPr lang="en-US"/>
               <a:t>Third level</a:t>
             </a:r>
           </a:p>
           <a:p>
             <a:pPr lvl="3"/>
             <a:r>
-              <a:rPr lang="en-US" smtClean="0"/>
+              <a:rPr lang="en-US"/>
               <a:t>Fourth level</a:t>
             </a:r>
           </a:p>
           <a:p>
             <a:pPr lvl="4"/>
             <a:r>
-              <a:rPr lang="en-US" smtClean="0"/>
+              <a:rPr lang="en-US"/>
               <a:t>Fifth level</a:t>
             </a:r>
-            <a:endParaRPr lang="en-US"/>
           </a:p>
         </p:txBody>
       </p:sp>
@@ -458,7 +470,7 @@
           <a:p>
             <a:fld id="{45A0B75F-C9A1-2042-8F04-68C06F63F9D5}" type="datetimeFigureOut">
               <a:rPr lang="en-US" smtClean="0"/>
-              <a:t>12/12/17</a:t>
+              <a:t>2/21/18</a:t>
             </a:fld>
             <a:endParaRPr lang="en-US"/>
           </a:p>
@@ -557,10 +569,9 @@
           <a:lstStyle/>
           <a:p>
             <a:r>
-              <a:rPr lang="en-US" smtClean="0"/>
+              <a:rPr lang="en-US"/>
               <a:t>Click to edit Master title style</a:t>
             </a:r>
-            <a:endParaRPr lang="en-US"/>
           </a:p>
         </p:txBody>
       </p:sp>
@@ -586,38 +597,37 @@
           <a:p>
             <a:pPr lvl="0"/>
             <a:r>
-              <a:rPr lang="en-US" smtClean="0"/>
+              <a:rPr lang="en-US"/>
               <a:t>Click to edit Master text styles</a:t>
             </a:r>
           </a:p>
           <a:p>
             <a:pPr lvl="1"/>
             <a:r>
-              <a:rPr lang="en-US" smtClean="0"/>
+              <a:rPr lang="en-US"/>
               <a:t>Second level</a:t>
             </a:r>
           </a:p>
           <a:p>
             <a:pPr lvl="2"/>
             <a:r>
-              <a:rPr lang="en-US" smtClean="0"/>
+              <a:rPr lang="en-US"/>
               <a:t>Third level</a:t>
             </a:r>
           </a:p>
           <a:p>
             <a:pPr lvl="3"/>
             <a:r>
-              <a:rPr lang="en-US" smtClean="0"/>
+              <a:rPr lang="en-US"/>
               <a:t>Fourth level</a:t>
             </a:r>
           </a:p>
           <a:p>
             <a:pPr lvl="4"/>
             <a:r>
-              <a:rPr lang="en-US" smtClean="0"/>
+              <a:rPr lang="en-US"/>
               <a:t>Fifth level</a:t>
             </a:r>
-            <a:endParaRPr lang="en-US"/>
           </a:p>
         </p:txBody>
       </p:sp>
@@ -638,7 +648,7 @@
           <a:p>
             <a:fld id="{45A0B75F-C9A1-2042-8F04-68C06F63F9D5}" type="datetimeFigureOut">
               <a:rPr lang="en-US" smtClean="0"/>
-              <a:t>12/12/17</a:t>
+              <a:t>2/21/18</a:t>
             </a:fld>
             <a:endParaRPr lang="en-US"/>
           </a:p>
@@ -732,10 +742,9 @@
           <a:lstStyle/>
           <a:p>
             <a:r>
-              <a:rPr lang="en-US" smtClean="0"/>
+              <a:rPr lang="en-US"/>
               <a:t>Click to edit Master title style</a:t>
             </a:r>
-            <a:endParaRPr lang="en-US"/>
           </a:p>
         </p:txBody>
       </p:sp>
@@ -756,38 +765,37 @@
           <a:p>
             <a:pPr lvl="0"/>
             <a:r>
-              <a:rPr lang="en-US" smtClean="0"/>
+              <a:rPr lang="en-US"/>
               <a:t>Click to edit Master text styles</a:t>
             </a:r>
           </a:p>
           <a:p>
             <a:pPr lvl="1"/>
             <a:r>
-              <a:rPr lang="en-US" smtClean="0"/>
+              <a:rPr lang="en-US"/>
               <a:t>Second level</a:t>
             </a:r>
           </a:p>
           <a:p>
             <a:pPr lvl="2"/>
             <a:r>
-              <a:rPr lang="en-US" smtClean="0"/>
+              <a:rPr lang="en-US"/>
               <a:t>Third level</a:t>
             </a:r>
           </a:p>
           <a:p>
             <a:pPr lvl="3"/>
             <a:r>
-              <a:rPr lang="en-US" smtClean="0"/>
+              <a:rPr lang="en-US"/>
               <a:t>Fourth level</a:t>
             </a:r>
           </a:p>
           <a:p>
             <a:pPr lvl="4"/>
             <a:r>
-              <a:rPr lang="en-US" smtClean="0"/>
+              <a:rPr lang="en-US"/>
               <a:t>Fifth level</a:t>
             </a:r>
-            <a:endParaRPr lang="en-US"/>
           </a:p>
         </p:txBody>
       </p:sp>
@@ -808,7 +816,7 @@
           <a:p>
             <a:fld id="{45A0B75F-C9A1-2042-8F04-68C06F63F9D5}" type="datetimeFigureOut">
               <a:rPr lang="en-US" smtClean="0"/>
-              <a:t>12/12/17</a:t>
+              <a:t>2/21/18</a:t>
             </a:fld>
             <a:endParaRPr lang="en-US"/>
           </a:p>
@@ -911,10 +919,9 @@
           </a:lstStyle>
           <a:p>
             <a:r>
-              <a:rPr lang="en-US" smtClean="0"/>
+              <a:rPr lang="en-US"/>
               <a:t>Click to edit Master title style</a:t>
             </a:r>
-            <a:endParaRPr lang="en-US"/>
           </a:p>
         </p:txBody>
       </p:sp>
@@ -1031,7 +1038,7 @@
           <a:p>
             <a:pPr lvl="0"/>
             <a:r>
-              <a:rPr lang="en-US" smtClean="0"/>
+              <a:rPr lang="en-US"/>
               <a:t>Click to edit Master text styles</a:t>
             </a:r>
           </a:p>
@@ -1054,7 +1061,7 @@
           <a:p>
             <a:fld id="{45A0B75F-C9A1-2042-8F04-68C06F63F9D5}" type="datetimeFigureOut">
               <a:rPr lang="en-US" smtClean="0"/>
-              <a:t>12/12/17</a:t>
+              <a:t>2/21/18</a:t>
             </a:fld>
             <a:endParaRPr lang="en-US"/>
           </a:p>
@@ -1148,10 +1155,9 @@
           <a:lstStyle/>
           <a:p>
             <a:r>
-              <a:rPr lang="en-US" smtClean="0"/>
+              <a:rPr lang="en-US"/>
               <a:t>Click to edit Master title style</a:t>
             </a:r>
-            <a:endParaRPr lang="en-US"/>
           </a:p>
         </p:txBody>
       </p:sp>
@@ -1205,38 +1211,37 @@
           <a:p>
             <a:pPr lvl="0"/>
             <a:r>
-              <a:rPr lang="en-US" smtClean="0"/>
+              <a:rPr lang="en-US"/>
               <a:t>Click to edit Master text styles</a:t>
             </a:r>
           </a:p>
           <a:p>
             <a:pPr lvl="1"/>
             <a:r>
-              <a:rPr lang="en-US" smtClean="0"/>
+              <a:rPr lang="en-US"/>
               <a:t>Second level</a:t>
             </a:r>
           </a:p>
           <a:p>
             <a:pPr lvl="2"/>
             <a:r>
-              <a:rPr lang="en-US" smtClean="0"/>
+              <a:rPr lang="en-US"/>
               <a:t>Third level</a:t>
             </a:r>
           </a:p>
           <a:p>
             <a:pPr lvl="3"/>
             <a:r>
-              <a:rPr lang="en-US" smtClean="0"/>
+              <a:rPr lang="en-US"/>
               <a:t>Fourth level</a:t>
             </a:r>
           </a:p>
           <a:p>
             <a:pPr lvl="4"/>
             <a:r>
-              <a:rPr lang="en-US" smtClean="0"/>
+              <a:rPr lang="en-US"/>
               <a:t>Fifth level</a:t>
             </a:r>
-            <a:endParaRPr lang="en-US"/>
           </a:p>
         </p:txBody>
       </p:sp>
@@ -1290,38 +1295,37 @@
           <a:p>
             <a:pPr lvl="0"/>
             <a:r>
-              <a:rPr lang="en-US" smtClean="0"/>
+              <a:rPr lang="en-US"/>
               <a:t>Click to edit Master text styles</a:t>
             </a:r>
           </a:p>
           <a:p>
             <a:pPr lvl="1"/>
             <a:r>
-              <a:rPr lang="en-US" smtClean="0"/>
+              <a:rPr lang="en-US"/>
               <a:t>Second level</a:t>
             </a:r>
           </a:p>
           <a:p>
             <a:pPr lvl="2"/>
             <a:r>
-              <a:rPr lang="en-US" smtClean="0"/>
+              <a:rPr lang="en-US"/>
               <a:t>Third level</a:t>
             </a:r>
           </a:p>
           <a:p>
             <a:pPr lvl="3"/>
             <a:r>
-              <a:rPr lang="en-US" smtClean="0"/>
+              <a:rPr lang="en-US"/>
               <a:t>Fourth level</a:t>
             </a:r>
           </a:p>
           <a:p>
             <a:pPr lvl="4"/>
             <a:r>
-              <a:rPr lang="en-US" smtClean="0"/>
+              <a:rPr lang="en-US"/>
               <a:t>Fifth level</a:t>
             </a:r>
-            <a:endParaRPr lang="en-US"/>
           </a:p>
         </p:txBody>
       </p:sp>
@@ -1342,7 +1346,7 @@
           <a:p>
             <a:fld id="{45A0B75F-C9A1-2042-8F04-68C06F63F9D5}" type="datetimeFigureOut">
               <a:rPr lang="en-US" smtClean="0"/>
-              <a:t>12/12/17</a:t>
+              <a:t>2/21/18</a:t>
             </a:fld>
             <a:endParaRPr lang="en-US"/>
           </a:p>
@@ -1440,10 +1444,9 @@
           </a:lstStyle>
           <a:p>
             <a:r>
-              <a:rPr lang="en-US" smtClean="0"/>
+              <a:rPr lang="en-US"/>
               <a:t>Click to edit Master title style</a:t>
             </a:r>
-            <a:endParaRPr lang="en-US"/>
           </a:p>
         </p:txBody>
       </p:sp>
@@ -1506,7 +1509,7 @@
           <a:p>
             <a:pPr lvl="0"/>
             <a:r>
-              <a:rPr lang="en-US" smtClean="0"/>
+              <a:rPr lang="en-US"/>
               <a:t>Click to edit Master text styles</a:t>
             </a:r>
           </a:p>
@@ -1562,38 +1565,37 @@
           <a:p>
             <a:pPr lvl="0"/>
             <a:r>
-              <a:rPr lang="en-US" smtClean="0"/>
+              <a:rPr lang="en-US"/>
               <a:t>Click to edit Master text styles</a:t>
             </a:r>
           </a:p>
           <a:p>
             <a:pPr lvl="1"/>
             <a:r>
-              <a:rPr lang="en-US" smtClean="0"/>
+              <a:rPr lang="en-US"/>
               <a:t>Second level</a:t>
             </a:r>
           </a:p>
           <a:p>
             <a:pPr lvl="2"/>
             <a:r>
-              <a:rPr lang="en-US" smtClean="0"/>
+              <a:rPr lang="en-US"/>
               <a:t>Third level</a:t>
             </a:r>
           </a:p>
           <a:p>
             <a:pPr lvl="3"/>
             <a:r>
-              <a:rPr lang="en-US" smtClean="0"/>
+              <a:rPr lang="en-US"/>
               <a:t>Fourth level</a:t>
             </a:r>
           </a:p>
           <a:p>
             <a:pPr lvl="4"/>
             <a:r>
-              <a:rPr lang="en-US" smtClean="0"/>
+              <a:rPr lang="en-US"/>
               <a:t>Fifth level</a:t>
             </a:r>
-            <a:endParaRPr lang="en-US"/>
           </a:p>
         </p:txBody>
       </p:sp>
@@ -1656,7 +1658,7 @@
           <a:p>
             <a:pPr lvl="0"/>
             <a:r>
-              <a:rPr lang="en-US" smtClean="0"/>
+              <a:rPr lang="en-US"/>
               <a:t>Click to edit Master text styles</a:t>
             </a:r>
           </a:p>
@@ -1712,38 +1714,37 @@
           <a:p>
             <a:pPr lvl="0"/>
             <a:r>
-              <a:rPr lang="en-US" smtClean="0"/>
+              <a:rPr lang="en-US"/>
               <a:t>Click to edit Master text styles</a:t>
             </a:r>
           </a:p>
           <a:p>
             <a:pPr lvl="1"/>
             <a:r>
-              <a:rPr lang="en-US" smtClean="0"/>
+              <a:rPr lang="en-US"/>
               <a:t>Second level</a:t>
             </a:r>
           </a:p>
           <a:p>
             <a:pPr lvl="2"/>
             <a:r>
-              <a:rPr lang="en-US" smtClean="0"/>
+              <a:rPr lang="en-US"/>
               <a:t>Third level</a:t>
             </a:r>
           </a:p>
           <a:p>
             <a:pPr lvl="3"/>
             <a:r>
-              <a:rPr lang="en-US" smtClean="0"/>
+              <a:rPr lang="en-US"/>
               <a:t>Fourth level</a:t>
             </a:r>
           </a:p>
           <a:p>
             <a:pPr lvl="4"/>
             <a:r>
-              <a:rPr lang="en-US" smtClean="0"/>
+              <a:rPr lang="en-US"/>
               <a:t>Fifth level</a:t>
             </a:r>
-            <a:endParaRPr lang="en-US"/>
           </a:p>
         </p:txBody>
       </p:sp>
@@ -1764,7 +1765,7 @@
           <a:p>
             <a:fld id="{45A0B75F-C9A1-2042-8F04-68C06F63F9D5}" type="datetimeFigureOut">
               <a:rPr lang="en-US" smtClean="0"/>
-              <a:t>12/12/17</a:t>
+              <a:t>2/21/18</a:t>
             </a:fld>
             <a:endParaRPr lang="en-US"/>
           </a:p>
@@ -1858,10 +1859,9 @@
           <a:lstStyle/>
           <a:p>
             <a:r>
-              <a:rPr lang="en-US" smtClean="0"/>
+              <a:rPr lang="en-US"/>
               <a:t>Click to edit Master title style</a:t>
             </a:r>
-            <a:endParaRPr lang="en-US"/>
           </a:p>
         </p:txBody>
       </p:sp>
@@ -1882,7 +1882,7 @@
           <a:p>
             <a:fld id="{45A0B75F-C9A1-2042-8F04-68C06F63F9D5}" type="datetimeFigureOut">
               <a:rPr lang="en-US" smtClean="0"/>
-              <a:t>12/12/17</a:t>
+              <a:t>2/21/18</a:t>
             </a:fld>
             <a:endParaRPr lang="en-US"/>
           </a:p>
@@ -1977,7 +1977,7 @@
           <a:p>
             <a:fld id="{45A0B75F-C9A1-2042-8F04-68C06F63F9D5}" type="datetimeFigureOut">
               <a:rPr lang="en-US" smtClean="0"/>
-              <a:t>12/12/17</a:t>
+              <a:t>2/21/18</a:t>
             </a:fld>
             <a:endParaRPr lang="en-US"/>
           </a:p>
@@ -2080,10 +2080,9 @@
           </a:lstStyle>
           <a:p>
             <a:r>
-              <a:rPr lang="en-US" smtClean="0"/>
+              <a:rPr lang="en-US"/>
               <a:t>Click to edit Master title style</a:t>
             </a:r>
-            <a:endParaRPr lang="en-US"/>
           </a:p>
         </p:txBody>
       </p:sp>
@@ -2137,38 +2136,37 @@
           <a:p>
             <a:pPr lvl="0"/>
             <a:r>
-              <a:rPr lang="en-US" smtClean="0"/>
+              <a:rPr lang="en-US"/>
               <a:t>Click to edit Master text styles</a:t>
             </a:r>
           </a:p>
           <a:p>
             <a:pPr lvl="1"/>
             <a:r>
-              <a:rPr lang="en-US" smtClean="0"/>
+              <a:rPr lang="en-US"/>
               <a:t>Second level</a:t>
             </a:r>
           </a:p>
           <a:p>
             <a:pPr lvl="2"/>
             <a:r>
-              <a:rPr lang="en-US" smtClean="0"/>
+              <a:rPr lang="en-US"/>
               <a:t>Third level</a:t>
             </a:r>
           </a:p>
           <a:p>
             <a:pPr lvl="3"/>
             <a:r>
-              <a:rPr lang="en-US" smtClean="0"/>
+              <a:rPr lang="en-US"/>
               <a:t>Fourth level</a:t>
             </a:r>
           </a:p>
           <a:p>
             <a:pPr lvl="4"/>
             <a:r>
-              <a:rPr lang="en-US" smtClean="0"/>
+              <a:rPr lang="en-US"/>
               <a:t>Fifth level</a:t>
             </a:r>
-            <a:endParaRPr lang="en-US"/>
           </a:p>
         </p:txBody>
       </p:sp>
@@ -2231,7 +2229,7 @@
           <a:p>
             <a:pPr lvl="0"/>
             <a:r>
-              <a:rPr lang="en-US" smtClean="0"/>
+              <a:rPr lang="en-US"/>
               <a:t>Click to edit Master text styles</a:t>
             </a:r>
           </a:p>
@@ -2254,7 +2252,7 @@
           <a:p>
             <a:fld id="{45A0B75F-C9A1-2042-8F04-68C06F63F9D5}" type="datetimeFigureOut">
               <a:rPr lang="en-US" smtClean="0"/>
-              <a:t>12/12/17</a:t>
+              <a:t>2/21/18</a:t>
             </a:fld>
             <a:endParaRPr lang="en-US"/>
           </a:p>
@@ -2357,10 +2355,9 @@
           </a:lstStyle>
           <a:p>
             <a:r>
-              <a:rPr lang="en-US" smtClean="0"/>
+              <a:rPr lang="en-US"/>
               <a:t>Click to edit Master title style</a:t>
             </a:r>
-            <a:endParaRPr lang="en-US"/>
           </a:p>
         </p:txBody>
       </p:sp>
@@ -2484,7 +2481,7 @@
           <a:p>
             <a:pPr lvl="0"/>
             <a:r>
-              <a:rPr lang="en-US" smtClean="0"/>
+              <a:rPr lang="en-US"/>
               <a:t>Click to edit Master text styles</a:t>
             </a:r>
           </a:p>
@@ -2507,7 +2504,7 @@
           <a:p>
             <a:fld id="{45A0B75F-C9A1-2042-8F04-68C06F63F9D5}" type="datetimeFigureOut">
               <a:rPr lang="en-US" smtClean="0"/>
-              <a:t>12/12/17</a:t>
+              <a:t>2/21/18</a:t>
             </a:fld>
             <a:endParaRPr lang="en-US"/>
           </a:p>
@@ -2616,10 +2613,9 @@
           <a:lstStyle/>
           <a:p>
             <a:r>
-              <a:rPr lang="en-US" smtClean="0"/>
+              <a:rPr lang="en-US"/>
               <a:t>Click to edit Master title style</a:t>
             </a:r>
-            <a:endParaRPr lang="en-US"/>
           </a:p>
         </p:txBody>
       </p:sp>
@@ -2650,38 +2646,37 @@
           <a:p>
             <a:pPr lvl="0"/>
             <a:r>
-              <a:rPr lang="en-US" smtClean="0"/>
+              <a:rPr lang="en-US"/>
               <a:t>Click to edit Master text styles</a:t>
             </a:r>
           </a:p>
           <a:p>
             <a:pPr lvl="1"/>
             <a:r>
-              <a:rPr lang="en-US" smtClean="0"/>
+              <a:rPr lang="en-US"/>
               <a:t>Second level</a:t>
             </a:r>
           </a:p>
           <a:p>
             <a:pPr lvl="2"/>
             <a:r>
-              <a:rPr lang="en-US" smtClean="0"/>
+              <a:rPr lang="en-US"/>
               <a:t>Third level</a:t>
             </a:r>
           </a:p>
           <a:p>
             <a:pPr lvl="3"/>
             <a:r>
-              <a:rPr lang="en-US" smtClean="0"/>
+              <a:rPr lang="en-US"/>
               <a:t>Fourth level</a:t>
             </a:r>
           </a:p>
           <a:p>
             <a:pPr lvl="4"/>
             <a:r>
-              <a:rPr lang="en-US" smtClean="0"/>
+              <a:rPr lang="en-US"/>
               <a:t>Fifth level</a:t>
             </a:r>
-            <a:endParaRPr lang="en-US"/>
           </a:p>
         </p:txBody>
       </p:sp>
@@ -2720,7 +2715,7 @@
           <a:p>
             <a:fld id="{45A0B75F-C9A1-2042-8F04-68C06F63F9D5}" type="datetimeFigureOut">
               <a:rPr lang="en-US" smtClean="0"/>
-              <a:t>12/12/17</a:t>
+              <a:t>2/21/18</a:t>
             </a:fld>
             <a:endParaRPr lang="en-US"/>
           </a:p>
@@ -3103,7 +3098,7 @@
         </p:nvSpPr>
         <p:spPr>
           <a:xfrm>
-            <a:off x="2586416" y="2445431"/>
+            <a:off x="2740791" y="2445431"/>
             <a:ext cx="3670683" cy="954107"/>
           </a:xfrm>
           <a:prstGeom prst="rect">
@@ -3127,8 +3122,8 @@
           <a:p>
             <a:pPr algn="ctr"/>
             <a:r>
-              <a:rPr lang="en-US" sz="2800" dirty="0" smtClean="0"/>
-              <a:t>flat segment</a:t>
+              <a:rPr lang="en-US" sz="2800" dirty="0"/>
+              <a:t>serialized segment</a:t>
             </a:r>
           </a:p>
           <a:p>
@@ -3140,13 +3135,15 @@
       <p:cxnSp>
         <p:nvCxnSpPr>
           <p:cNvPr id="80" name="Straight Arrow Connector 79"/>
-          <p:cNvCxnSpPr/>
+          <p:cNvCxnSpPr>
+            <a:cxnSpLocks/>
+          </p:cNvCxnSpPr>
           <p:nvPr/>
         </p:nvCxnSpPr>
         <p:spPr>
           <a:xfrm flipH="1">
-            <a:off x="3767379" y="3338461"/>
-            <a:ext cx="608206" cy="976488"/>
+            <a:off x="3767380" y="3313711"/>
+            <a:ext cx="284881" cy="1001238"/>
           </a:xfrm>
           <a:prstGeom prst="straightConnector1">
             <a:avLst/>
@@ -3174,14 +3171,15 @@
         <p:nvCxnSpPr>
           <p:cNvPr id="82" name="Straight Arrow Connector 81"/>
           <p:cNvCxnSpPr>
+            <a:cxnSpLocks/>
             <a:endCxn id="27" idx="0"/>
           </p:cNvCxnSpPr>
           <p:nvPr/>
         </p:nvCxnSpPr>
         <p:spPr>
           <a:xfrm>
-            <a:off x="4486829" y="3338461"/>
-            <a:ext cx="593290" cy="976488"/>
+            <a:off x="4096987" y="3313711"/>
+            <a:ext cx="983132" cy="1001238"/>
           </a:xfrm>
           <a:prstGeom prst="straightConnector1">
             <a:avLst/>
@@ -3214,13 +3212,13 @@
           <p:nvPr>
             <p:extLst>
               <p:ext uri="{D42A27DB-BD31-4B8C-83A1-F6EECF244321}">
-                <p14:modId xmlns:p14="http://schemas.microsoft.com/office/powerpoint/2010/main" val="2889193257"/>
+                <p14:modId xmlns:p14="http://schemas.microsoft.com/office/powerpoint/2010/main" val="2458637979"/>
               </p:ext>
             </p:extLst>
           </p:nvPr>
         </p:nvGraphicFramePr>
         <p:xfrm>
-          <a:off x="2675179" y="2942871"/>
+          <a:off x="2829554" y="2942871"/>
           <a:ext cx="3452136" cy="370840"/>
         </p:xfrm>
         <a:graphic>
@@ -3230,12 +3228,48 @@
                 <a:tableStyleId>{5C22544A-7EE6-4342-B048-85BDC9FD1C3A}</a:tableStyleId>
               </a:tblPr>
               <a:tblGrid>
-                <a:gridCol w="575356"/>
-                <a:gridCol w="575356"/>
-                <a:gridCol w="575356"/>
-                <a:gridCol w="575356"/>
-                <a:gridCol w="575356"/>
-                <a:gridCol w="575356"/>
+                <a:gridCol w="575356">
+                  <a:extLst>
+                    <a:ext uri="{9D8B030D-6E8A-4147-A177-3AD203B41FA5}">
+                      <a16:colId xmlns:a16="http://schemas.microsoft.com/office/drawing/2014/main" val="20000"/>
+                    </a:ext>
+                  </a:extLst>
+                </a:gridCol>
+                <a:gridCol w="575356">
+                  <a:extLst>
+                    <a:ext uri="{9D8B030D-6E8A-4147-A177-3AD203B41FA5}">
+                      <a16:colId xmlns:a16="http://schemas.microsoft.com/office/drawing/2014/main" val="20001"/>
+                    </a:ext>
+                  </a:extLst>
+                </a:gridCol>
+                <a:gridCol w="575356">
+                  <a:extLst>
+                    <a:ext uri="{9D8B030D-6E8A-4147-A177-3AD203B41FA5}">
+                      <a16:colId xmlns:a16="http://schemas.microsoft.com/office/drawing/2014/main" val="20002"/>
+                    </a:ext>
+                  </a:extLst>
+                </a:gridCol>
+                <a:gridCol w="575356">
+                  <a:extLst>
+                    <a:ext uri="{9D8B030D-6E8A-4147-A177-3AD203B41FA5}">
+                      <a16:colId xmlns:a16="http://schemas.microsoft.com/office/drawing/2014/main" val="20003"/>
+                    </a:ext>
+                  </a:extLst>
+                </a:gridCol>
+                <a:gridCol w="575356">
+                  <a:extLst>
+                    <a:ext uri="{9D8B030D-6E8A-4147-A177-3AD203B41FA5}">
+                      <a16:colId xmlns:a16="http://schemas.microsoft.com/office/drawing/2014/main" val="20004"/>
+                    </a:ext>
+                  </a:extLst>
+                </a:gridCol>
+                <a:gridCol w="575356">
+                  <a:extLst>
+                    <a:ext uri="{9D8B030D-6E8A-4147-A177-3AD203B41FA5}">
+                      <a16:colId xmlns:a16="http://schemas.microsoft.com/office/drawing/2014/main" val="20005"/>
+                    </a:ext>
+                  </a:extLst>
+                </a:gridCol>
               </a:tblGrid>
               <a:tr h="370840">
                 <a:tc>
@@ -3340,6 +3374,11 @@
                     </a:solidFill>
                   </a:tcPr>
                 </a:tc>
+                <a:extLst>
+                  <a:ext uri="{0D108BD9-81ED-4DB2-BD59-A6C34878D82A}">
+                    <a16:rowId xmlns:a16="http://schemas.microsoft.com/office/drawing/2014/main" val="10000"/>
+                  </a:ext>
+                </a:extLst>
               </a:tr>
             </a:tbl>
           </a:graphicData>
@@ -3377,10 +3416,9 @@
           <a:p>
             <a:pPr algn="ctr"/>
             <a:r>
-              <a:rPr lang="en-US" sz="2800" dirty="0" smtClean="0"/>
+              <a:rPr lang="en-US" sz="2800" dirty="0"/>
               <a:t>key</a:t>
             </a:r>
-            <a:endParaRPr lang="en-US" sz="2800" dirty="0"/>
           </a:p>
         </p:txBody>
       </p:sp>
@@ -3416,10 +3454,9 @@
           <a:p>
             <a:pPr algn="ctr"/>
             <a:r>
-              <a:rPr lang="en-US" sz="2800" dirty="0" smtClean="0"/>
+              <a:rPr lang="en-US" sz="2800" dirty="0"/>
               <a:t>value</a:t>
             </a:r>
-            <a:endParaRPr lang="en-US" sz="2800" dirty="0"/>
           </a:p>
         </p:txBody>
       </p:sp>
@@ -3455,22 +3492,17 @@
           <a:p>
             <a:pPr algn="ctr"/>
             <a:r>
-              <a:rPr lang="en-US" sz="2800" dirty="0" smtClean="0"/>
+              <a:rPr lang="en-US" sz="2800" dirty="0"/>
               <a:t>…                                                 …               </a:t>
             </a:r>
             <a:r>
-              <a:rPr lang="en-US" sz="2800" dirty="0" smtClean="0">
+              <a:rPr lang="en-US" sz="2800" dirty="0">
                 <a:solidFill>
                   <a:schemeClr val="bg1"/>
                 </a:solidFill>
               </a:rPr>
               <a:t>.</a:t>
             </a:r>
-            <a:endParaRPr lang="en-US" sz="2800" dirty="0">
-              <a:solidFill>
-                <a:schemeClr val="bg1"/>
-              </a:solidFill>
-            </a:endParaRPr>
           </a:p>
         </p:txBody>
       </p:sp>
@@ -3496,7 +3528,46 @@
           <a:lstStyle/>
           <a:p>
             <a:r>
-              <a:rPr lang="en-US" sz="2800" dirty="0" err="1" smtClean="0">
+              <a:rPr lang="en-US" sz="2800" dirty="0" err="1">
+                <a:solidFill>
+                  <a:prstClr val="black"/>
+                </a:solidFill>
+              </a:rPr>
+              <a:t>mslab</a:t>
+            </a:r>
+            <a:endParaRPr lang="en-US" dirty="0"/>
+          </a:p>
+        </p:txBody>
+      </p:sp>
+      <p:sp>
+        <p:nvSpPr>
+          <p:cNvPr id="12" name="Rectangle 11">
+            <a:extLst>
+              <a:ext uri="{FF2B5EF4-FFF2-40B4-BE49-F238E27FC236}">
+                <a16:creationId xmlns:a16="http://schemas.microsoft.com/office/drawing/2014/main" id="{C165E0C6-206C-1E41-9A9D-F492D3AA49D4}"/>
+              </a:ext>
+            </a:extLst>
+          </p:cNvPr>
+          <p:cNvSpPr/>
+          <p:nvPr/>
+        </p:nvSpPr>
+        <p:spPr>
+          <a:xfrm>
+            <a:off x="1620181" y="2480065"/>
+            <a:ext cx="1054996" cy="523220"/>
+          </a:xfrm>
+          <a:prstGeom prst="rect">
+            <a:avLst/>
+          </a:prstGeom>
+        </p:spPr>
+        <p:txBody>
+          <a:bodyPr wrap="none">
+            <a:spAutoFit/>
+          </a:bodyPr>
+          <a:lstStyle/>
+          <a:p>
+            <a:r>
+              <a:rPr lang="en-US" sz="2800" dirty="0" err="1">
                 <a:solidFill>
                   <a:prstClr val="black"/>
                 </a:solidFill>

</xml_diff>